<commit_message>
probally more than i wanted to git add
</commit_message>
<xml_diff>
--- a/Daniel Easteals Quantum Computing.pptx
+++ b/Daniel Easteals Quantum Computing.pptx
@@ -12,9 +12,9 @@
     <p:sldId id="257" r:id="rId3"/>
     <p:sldId id="258" r:id="rId4"/>
     <p:sldId id="259" r:id="rId5"/>
-    <p:sldId id="260" r:id="rId6"/>
+    <p:sldId id="262" r:id="rId6"/>
     <p:sldId id="261" r:id="rId7"/>
-    <p:sldId id="262" r:id="rId8"/>
+    <p:sldId id="260" r:id="rId8"/>
     <p:sldId id="263" r:id="rId9"/>
     <p:sldId id="264" r:id="rId10"/>
   </p:sldIdLst>
@@ -205,7 +205,7 @@
           <a:p>
             <a:fld id="{D7F7C2FD-2975-449C-A714-38C07CCE110B}" type="datetimeFigureOut">
               <a:rPr lang="en-GB" smtClean="0"/>
-              <a:t>27/04/2017</a:t>
+              <a:t>01/05/2017</a:t>
             </a:fld>
             <a:endParaRPr lang="en-GB" dirty="0"/>
           </a:p>
@@ -703,11 +703,113 @@
           <a:p>
             <a:r>
               <a:rPr lang="en-GB" dirty="0" smtClean="0"/>
-              <a:t>Ok, so</a:t>
+              <a:t>Classical bits</a:t>
+            </a:r>
+          </a:p>
+          <a:p>
+            <a:r>
+              <a:rPr lang="en-GB" dirty="0" smtClean="0"/>
+              <a:t>Qubits</a:t>
+            </a:r>
+          </a:p>
+          <a:p>
+            <a:r>
+              <a:rPr lang="en-GB" dirty="0" smtClean="0"/>
+              <a:t>Diagram</a:t>
+            </a:r>
+          </a:p>
+          <a:p>
+            <a:r>
+              <a:rPr lang="en-GB" dirty="0" smtClean="0"/>
+              <a:t>Probability</a:t>
+            </a:r>
+          </a:p>
+          <a:p>
+            <a:r>
+              <a:rPr lang="en-GB" dirty="0" smtClean="0"/>
+              <a:t>Lowest point in a vast landscape</a:t>
+            </a:r>
+          </a:p>
+          <a:p>
+            <a:r>
+              <a:rPr lang="en-GB" dirty="0" smtClean="0"/>
+              <a:t>Made by D-Wave</a:t>
+            </a:r>
+          </a:p>
+          <a:p>
+            <a:endParaRPr lang="en-GB" dirty="0" smtClean="0"/>
+          </a:p>
+          <a:p>
+            <a:endParaRPr lang="en-GB" dirty="0" smtClean="0"/>
+          </a:p>
+          <a:p>
+            <a:r>
+              <a:rPr lang="en-GB" sz="1200" dirty="0" smtClean="0"/>
+              <a:t>Computing with qubits rather than bits</a:t>
+            </a:r>
+          </a:p>
+          <a:p>
+            <a:endParaRPr lang="en-GB" sz="1200" dirty="0" smtClean="0"/>
+          </a:p>
+          <a:p>
+            <a:r>
+              <a:rPr lang="en-GB" sz="1200" dirty="0" smtClean="0"/>
+              <a:t>Uses superposition of particles</a:t>
+            </a:r>
+          </a:p>
+          <a:p>
+            <a:endParaRPr lang="en-GB" sz="1200" dirty="0" smtClean="0"/>
+          </a:p>
+          <a:p>
+            <a:r>
+              <a:rPr lang="en-GB" sz="1200" dirty="0" smtClean="0"/>
+              <a:t>Returns a probability for minimisation</a:t>
+            </a:r>
+          </a:p>
+          <a:p>
+            <a:endParaRPr lang="en-GB" sz="1200" dirty="0" smtClean="0"/>
+          </a:p>
+          <a:p>
+            <a:r>
+              <a:rPr lang="en-GB" sz="1200" dirty="0" smtClean="0"/>
+              <a:t>Produced by D-Wave</a:t>
+            </a:r>
+          </a:p>
+          <a:p>
+            <a:endParaRPr lang="en-GB" dirty="0" smtClean="0"/>
+          </a:p>
+          <a:p>
+            <a:endParaRPr lang="en-GB" dirty="0" smtClean="0"/>
+          </a:p>
+          <a:p>
+            <a:r>
+              <a:rPr lang="en-GB" dirty="0" smtClean="0"/>
+              <a:t>Ok</a:t>
+            </a:r>
+            <a:r>
+              <a:rPr lang="en-GB" dirty="0" smtClean="0"/>
+              <a:t>, so</a:t>
             </a:r>
             <a:r>
               <a:rPr lang="en-GB" baseline="0" dirty="0" smtClean="0"/>
               <a:t> to start off with I will quickly explain how quantum computers actually work and therefore what they are good for. To start off with you need to know that quantum computers don’t work with the standard bits 1,0 that computers use but instead they use something called a qubit, now this is where it gets strange and into the world of quantum mechanics comes into play hence the name. a qubit is a particle that is either in a spin up state ( shown here ) as one, or in a spin down state ( shown here ) as 0, now like this you can use them normally as shown here as the binary for 5 is 0101, but they can also be in a super position as shown here. In this state it is a 1 and a 0 at the same time. So this is 4 or 5. Due to this when you do computing you will get a probability as the answer. This then means that it is very good at solving stuff that is not well defined or is of a high level. This then leads to them being so powerful. </a:t>
+            </a:r>
+          </a:p>
+          <a:p>
+            <a:endParaRPr lang="en-GB" baseline="0" dirty="0" smtClean="0"/>
+          </a:p>
+          <a:p>
+            <a:r>
+              <a:rPr lang="en-US" sz="1200" b="0" i="0" kern="1200" dirty="0" smtClean="0">
+                <a:solidFill>
+                  <a:schemeClr val="tx1"/>
+                </a:solidFill>
+                <a:effectLst/>
+                <a:latin typeface="+mn-lt"/>
+                <a:ea typeface="+mn-ea"/>
+                <a:cs typeface="+mn-cs"/>
+              </a:rPr>
+              <a:t>lowest point in a vast landscape</a:t>
             </a:r>
             <a:endParaRPr lang="en-GB" dirty="0"/>
           </a:p>
@@ -795,7 +897,34 @@
           <a:p>
             <a:r>
               <a:rPr lang="en-GB" dirty="0" smtClean="0"/>
-              <a:t>Ok, so</a:t>
+              <a:t>Be more personal, explain how you are interested</a:t>
+            </a:r>
+          </a:p>
+          <a:p>
+            <a:endParaRPr lang="en-GB" dirty="0" smtClean="0"/>
+          </a:p>
+          <a:p>
+            <a:r>
+              <a:rPr lang="en-GB" dirty="0" smtClean="0"/>
+              <a:t>Maybe</a:t>
+            </a:r>
+            <a:r>
+              <a:rPr lang="en-GB" baseline="0" dirty="0" smtClean="0"/>
+              <a:t> say about beginning of classical computers</a:t>
+            </a:r>
+            <a:endParaRPr lang="en-GB" dirty="0" smtClean="0"/>
+          </a:p>
+          <a:p>
+            <a:endParaRPr lang="en-GB" dirty="0" smtClean="0"/>
+          </a:p>
+          <a:p>
+            <a:r>
+              <a:rPr lang="en-GB" dirty="0" smtClean="0"/>
+              <a:t>Ok</a:t>
+            </a:r>
+            <a:r>
+              <a:rPr lang="en-GB" dirty="0" smtClean="0"/>
+              <a:t>, so</a:t>
             </a:r>
             <a:r>
               <a:rPr lang="en-GB" baseline="0" dirty="0" smtClean="0"/>
@@ -914,11 +1043,33 @@
           <a:p>
             <a:r>
               <a:rPr lang="en-GB" dirty="0" smtClean="0"/>
-              <a:t>So,</a:t>
+              <a:t>Not just lives but also crops and so on</a:t>
+            </a:r>
+          </a:p>
+          <a:p>
+            <a:endParaRPr lang="en-GB" dirty="0" smtClean="0"/>
+          </a:p>
+          <a:p>
+            <a:r>
+              <a:rPr lang="en-GB" dirty="0" smtClean="0"/>
+              <a:t>amazing</a:t>
+            </a:r>
+          </a:p>
+          <a:p>
+            <a:endParaRPr lang="en-GB" dirty="0" smtClean="0"/>
+          </a:p>
+          <a:p>
+            <a:r>
+              <a:rPr lang="en-GB" dirty="0" smtClean="0"/>
+              <a:t>But </a:t>
+            </a:r>
+            <a:r>
+              <a:rPr lang="en-GB" dirty="0" smtClean="0"/>
+              <a:t>how about in a more general sense rather</a:t>
             </a:r>
             <a:r>
               <a:rPr lang="en-GB" baseline="0" dirty="0" smtClean="0"/>
-              <a:t> you know that I find quantum computing interesting, but how does it actually impact me on a daily basis and work in the real world. Well, right here I have an example of what it can do and that is labelling news stories and images appropriately. At first this may sound a bit strange as computers at the moment can do this and it seems like it is of no consequence, but it is. Whenever you read a news article online it will have a certain topic to it, or if you are searching for images then all of them will be of something and these are things that need to be computed. </a:t>
+              <a:t> than just an individual or a company, what about society in general. Well, a new technology that could help with that is self driving cars as they have the potential to save thousands of lives and make travel more efficient. Well, as you may know, google are currently the main people who are working on self driving cars and they are the main people with quantum computers so they decided to combine them. </a:t>
             </a:r>
           </a:p>
           <a:p>
@@ -927,33 +1078,13 @@
           <a:p>
             <a:r>
               <a:rPr lang="en-GB" baseline="0" dirty="0" smtClean="0"/>
-              <a:t>Now there are some corpuses of example of these things and they are the REUTERS corpus for news articles and the SCENE corpus for images. With these in mind the people at Dwave have trained the quantum computer to recognise what labelling should be and what to do, and to see the results we only need to look at what they have said: </a:t>
+              <a:t>The way that they did this was that they got the quantum computers to come up with ways of recognising what is actually in an image and then translating that to a way that the cars can use in real time, in addition to this the quantum computers also helped write the algorithms and the code for the cars. As you may know, this has been a good success and google have even said so as they have said it works great: </a:t>
             </a:r>
             <a:r>
               <a:rPr lang="en-US" i="1" dirty="0" smtClean="0"/>
-              <a:t>We found that our approach worked extremely well on these problems” , </a:t>
-            </a:r>
-            <a:r>
-              <a:rPr lang="en-US" i="0" dirty="0" smtClean="0"/>
-              <a:t>that’s amazing when you think</a:t>
-            </a:r>
-            <a:r>
-              <a:rPr lang="en-US" i="0" baseline="0" dirty="0" smtClean="0"/>
-              <a:t> about it as they have said that it has been a success, but it doesn’t just need to work…it needs to work well, and well lets see what they say about that: “</a:t>
-            </a:r>
-            <a:r>
-              <a:rPr lang="en-US" i="1" dirty="0" smtClean="0"/>
-              <a:t>[Dwave] provided better labeling accuracy than a state of the art conventional approach”, </a:t>
-            </a:r>
-            <a:r>
-              <a:rPr lang="en-US" i="0" dirty="0" smtClean="0"/>
-              <a:t>thus</a:t>
-            </a:r>
-            <a:r>
-              <a:rPr lang="en-US" i="0" baseline="0" dirty="0" smtClean="0"/>
-              <a:t> us great for quantum computers as they work and they work well meaning that this could become widespread in the future. </a:t>
-            </a:r>
-            <a:endParaRPr lang="en-GB" i="0" dirty="0"/>
+              <a:t>Google has shown the D-Wave can significantly outperform on traditional chips”</a:t>
+            </a:r>
+            <a:endParaRPr lang="en-GB" dirty="0"/>
           </a:p>
         </p:txBody>
       </p:sp>
@@ -983,7 +1114,7 @@
     </p:spTree>
     <p:extLst>
       <p:ext uri="{BB962C8B-B14F-4D97-AF65-F5344CB8AC3E}">
-        <p14:creationId xmlns:p14="http://schemas.microsoft.com/office/powerpoint/2010/main" val="3132438659"/>
+        <p14:creationId xmlns:p14="http://schemas.microsoft.com/office/powerpoint/2010/main" val="1436745996"/>
       </p:ext>
     </p:extLst>
   </p:cSld>
@@ -1185,11 +1316,29 @@
           <a:p>
             <a:r>
               <a:rPr lang="en-GB" dirty="0" smtClean="0"/>
-              <a:t>But how about in a more general sense rather</a:t>
+              <a:t>More committed I</a:t>
             </a:r>
             <a:r>
               <a:rPr lang="en-GB" baseline="0" dirty="0" smtClean="0"/>
-              <a:t> than just an individual or a company, what about society in general. Well, a new technology that could help with that is self driving cars as they have the potential to save thousands of lives and make travel more efficient. Well, as you may know, google are currently the main people who are working on self driving cars and they are the main people with quantum computers so they decided to combine them. </a:t>
+              <a:t> WILL BE I expect in 20 years time that qc will be used all the time and be an integral part</a:t>
+            </a:r>
+            <a:endParaRPr lang="en-GB" dirty="0" smtClean="0"/>
+          </a:p>
+          <a:p>
+            <a:endParaRPr lang="en-GB" dirty="0" smtClean="0"/>
+          </a:p>
+          <a:p>
+            <a:r>
+              <a:rPr lang="en-GB" dirty="0" smtClean="0"/>
+              <a:t>So</a:t>
+            </a:r>
+            <a:r>
+              <a:rPr lang="en-GB" dirty="0" smtClean="0"/>
+              <a:t>,</a:t>
+            </a:r>
+            <a:r>
+              <a:rPr lang="en-GB" baseline="0" dirty="0" smtClean="0"/>
+              <a:t> you know that I find quantum computing interesting, but how does it actually impact me on a daily basis and work in the real world. Well, right here I have an example of what it can do and that is labelling news stories and images appropriately. At first this may sound a bit strange as computers at the moment can do this and it seems like it is of no consequence, but it is. Whenever you read a news article online it will have a certain topic to it, or if you are searching for images then all of them will be of something and these are things that need to be computed. </a:t>
             </a:r>
           </a:p>
           <a:p>
@@ -1198,13 +1347,33 @@
           <a:p>
             <a:r>
               <a:rPr lang="en-GB" baseline="0" dirty="0" smtClean="0"/>
-              <a:t>The way that they did this was that they got the quantum computers to come up with ways of recognising what is actually in an image and then translating that to a way that the cars can use in real time, in addition to this the quantum computers also helped write the algorithms and the code for the cars. As you may know, this has been a good success and google have even said so as they have said it works great: </a:t>
+              <a:t>Now there are some corpuses of example of these things and they are the REUTERS corpus for news articles and the SCENE corpus for images. With these in mind the people at Dwave have trained the quantum computer to recognise what labelling should be and what to do, and to see the results we only need to look at what they have said: </a:t>
             </a:r>
             <a:r>
               <a:rPr lang="en-US" i="1" dirty="0" smtClean="0"/>
-              <a:t>Google has shown the D-Wave can significantly outperform on traditional chips”</a:t>
-            </a:r>
-            <a:endParaRPr lang="en-GB" dirty="0"/>
+              <a:t>We found that our approach worked extremely well on these problems” , </a:t>
+            </a:r>
+            <a:r>
+              <a:rPr lang="en-US" i="0" dirty="0" smtClean="0"/>
+              <a:t>that’s amazing when you think</a:t>
+            </a:r>
+            <a:r>
+              <a:rPr lang="en-US" i="0" baseline="0" dirty="0" smtClean="0"/>
+              <a:t> about it as they have said that it has been a success, but it doesn’t just need to work…it needs to work well, and well lets see what they say about that: “</a:t>
+            </a:r>
+            <a:r>
+              <a:rPr lang="en-US" i="1" dirty="0" smtClean="0"/>
+              <a:t>[Dwave] provided better labeling accuracy than a state of the art conventional approach”, </a:t>
+            </a:r>
+            <a:r>
+              <a:rPr lang="en-US" i="0" dirty="0" smtClean="0"/>
+              <a:t>thus</a:t>
+            </a:r>
+            <a:r>
+              <a:rPr lang="en-US" i="0" baseline="0" dirty="0" smtClean="0"/>
+              <a:t> us great for quantum computers as they work and they work well meaning that this could become widespread in the future. </a:t>
+            </a:r>
+            <a:endParaRPr lang="en-GB" i="0" dirty="0"/>
           </a:p>
         </p:txBody>
       </p:sp>
@@ -1234,7 +1403,7 @@
     </p:spTree>
     <p:extLst>
       <p:ext uri="{BB962C8B-B14F-4D97-AF65-F5344CB8AC3E}">
-        <p14:creationId xmlns:p14="http://schemas.microsoft.com/office/powerpoint/2010/main" val="1436745996"/>
+        <p14:creationId xmlns:p14="http://schemas.microsoft.com/office/powerpoint/2010/main" val="3132438659"/>
       </p:ext>
     </p:extLst>
   </p:cSld>
@@ -1307,7 +1476,144 @@
             </a:pPr>
             <a:r>
               <a:rPr lang="en-GB" dirty="0" smtClean="0"/>
-              <a:t>Finally, there is the more pressing and important matter that is</a:t>
+              <a:t>More opportunistic, those using quantum can be much more secure than</a:t>
+            </a:r>
+            <a:r>
+              <a:rPr lang="en-GB" baseline="0" dirty="0" smtClean="0"/>
+              <a:t> classical</a:t>
+            </a:r>
+          </a:p>
+          <a:p>
+            <a:pPr marL="0" marR="0" indent="0" algn="l" defTabSz="914400" rtl="0" eaLnBrk="1" fontAlgn="auto" latinLnBrk="0" hangingPunct="1">
+              <a:lnSpc>
+                <a:spcPct val="100000"/>
+              </a:lnSpc>
+              <a:spcBef>
+                <a:spcPts val="0"/>
+              </a:spcBef>
+              <a:spcAft>
+                <a:spcPts val="0"/>
+              </a:spcAft>
+              <a:buClrTx/>
+              <a:buSzTx/>
+              <a:buFontTx/>
+              <a:buNone/>
+              <a:tabLst/>
+              <a:defRPr/>
+            </a:pPr>
+            <a:endParaRPr lang="en-GB" baseline="0" dirty="0" smtClean="0"/>
+          </a:p>
+          <a:p>
+            <a:pPr marL="0" marR="0" indent="0" algn="l" defTabSz="914400" rtl="0" eaLnBrk="1" fontAlgn="auto" latinLnBrk="0" hangingPunct="1">
+              <a:lnSpc>
+                <a:spcPct val="100000"/>
+              </a:lnSpc>
+              <a:spcBef>
+                <a:spcPts val="0"/>
+              </a:spcBef>
+              <a:spcAft>
+                <a:spcPts val="0"/>
+              </a:spcAft>
+              <a:buClrTx/>
+              <a:buSzTx/>
+              <a:buFontTx/>
+              <a:buNone/>
+              <a:tabLst/>
+              <a:defRPr/>
+            </a:pPr>
+            <a:r>
+              <a:rPr lang="en-GB" baseline="0" dirty="0" smtClean="0"/>
+              <a:t>Don’t say not how you think</a:t>
+            </a:r>
+          </a:p>
+          <a:p>
+            <a:pPr marL="0" marR="0" indent="0" algn="l" defTabSz="914400" rtl="0" eaLnBrk="1" fontAlgn="auto" latinLnBrk="0" hangingPunct="1">
+              <a:lnSpc>
+                <a:spcPct val="100000"/>
+              </a:lnSpc>
+              <a:spcBef>
+                <a:spcPts val="0"/>
+              </a:spcBef>
+              <a:spcAft>
+                <a:spcPts val="0"/>
+              </a:spcAft>
+              <a:buClrTx/>
+              <a:buSzTx/>
+              <a:buFontTx/>
+              <a:buNone/>
+              <a:tabLst/>
+              <a:defRPr/>
+            </a:pPr>
+            <a:endParaRPr lang="en-GB" baseline="0" dirty="0" smtClean="0"/>
+          </a:p>
+          <a:p>
+            <a:pPr marL="0" marR="0" indent="0" algn="l" defTabSz="914400" rtl="0" eaLnBrk="1" fontAlgn="auto" latinLnBrk="0" hangingPunct="1">
+              <a:lnSpc>
+                <a:spcPct val="100000"/>
+              </a:lnSpc>
+              <a:spcBef>
+                <a:spcPts val="0"/>
+              </a:spcBef>
+              <a:spcAft>
+                <a:spcPts val="0"/>
+              </a:spcAft>
+              <a:buClrTx/>
+              <a:buSzTx/>
+              <a:buFontTx/>
+              <a:buNone/>
+              <a:tabLst/>
+              <a:defRPr/>
+            </a:pPr>
+            <a:r>
+              <a:rPr lang="en-GB" baseline="0" dirty="0" smtClean="0"/>
+              <a:t>50 and 10 are EXPECTED results</a:t>
+            </a:r>
+          </a:p>
+          <a:p>
+            <a:pPr marL="0" marR="0" indent="0" algn="l" defTabSz="914400" rtl="0" eaLnBrk="1" fontAlgn="auto" latinLnBrk="0" hangingPunct="1">
+              <a:lnSpc>
+                <a:spcPct val="100000"/>
+              </a:lnSpc>
+              <a:spcBef>
+                <a:spcPts val="0"/>
+              </a:spcBef>
+              <a:spcAft>
+                <a:spcPts val="0"/>
+              </a:spcAft>
+              <a:buClrTx/>
+              <a:buSzTx/>
+              <a:buFontTx/>
+              <a:buNone/>
+              <a:tabLst/>
+              <a:defRPr/>
+            </a:pPr>
+            <a:endParaRPr lang="en-GB" dirty="0" smtClean="0"/>
+          </a:p>
+          <a:p>
+            <a:pPr marL="0" marR="0" indent="0" algn="l" defTabSz="914400" rtl="0" eaLnBrk="1" fontAlgn="auto" latinLnBrk="0" hangingPunct="1">
+              <a:lnSpc>
+                <a:spcPct val="100000"/>
+              </a:lnSpc>
+              <a:spcBef>
+                <a:spcPts val="0"/>
+              </a:spcBef>
+              <a:spcAft>
+                <a:spcPts val="0"/>
+              </a:spcAft>
+              <a:buClrTx/>
+              <a:buSzTx/>
+              <a:buFontTx/>
+              <a:buNone/>
+              <a:tabLst/>
+              <a:defRPr/>
+            </a:pPr>
+            <a:r>
+              <a:rPr lang="en-GB" dirty="0" smtClean="0"/>
+              <a:t>Finally</a:t>
+            </a:r>
+            <a:r>
+              <a:rPr lang="en-GB" dirty="0" smtClean="0"/>
+              <a:t>, there is the more pressing and important matter that is</a:t>
             </a:r>
             <a:r>
               <a:rPr lang="en-GB" baseline="0" dirty="0" smtClean="0"/>
@@ -1669,7 +1975,7 @@
           <a:p>
             <a:fld id="{1160EA64-D806-43AC-9DF2-F8C432F32B4C}" type="datetimeFigureOut">
               <a:rPr lang="en-US" smtClean="0"/>
-              <a:t>4/26/2017</a:t>
+              <a:t>5/1/2017</a:t>
             </a:fld>
             <a:endParaRPr lang="en-US" dirty="0"/>
           </a:p>
@@ -1840,7 +2146,7 @@
           <a:p>
             <a:fld id="{E9F9C37B-1D36-470B-8223-D6C91242EC14}" type="datetimeFigureOut">
               <a:rPr lang="en-US" smtClean="0"/>
-              <a:t>4/26/2017</a:t>
+              <a:t>5/1/2017</a:t>
             </a:fld>
             <a:endParaRPr lang="en-US" dirty="0"/>
           </a:p>
@@ -2020,7 +2326,7 @@
           <a:p>
             <a:fld id="{67C6F52A-A82B-47A2-A83A-8C4C91F2D59F}" type="datetimeFigureOut">
               <a:rPr lang="en-US" smtClean="0"/>
-              <a:t>4/26/2017</a:t>
+              <a:t>5/1/2017</a:t>
             </a:fld>
             <a:endParaRPr lang="en-US" dirty="0"/>
           </a:p>
@@ -2190,7 +2496,7 @@
           <a:p>
             <a:fld id="{F070A7B3-6521-4DCA-87E5-044747A908C1}" type="datetimeFigureOut">
               <a:rPr lang="en-US" smtClean="0"/>
-              <a:t>4/26/2017</a:t>
+              <a:t>5/1/2017</a:t>
             </a:fld>
             <a:endParaRPr lang="en-US" dirty="0"/>
           </a:p>
@@ -2459,7 +2765,7 @@
           <a:p>
             <a:fld id="{1160EA64-D806-43AC-9DF2-F8C432F32B4C}" type="datetimeFigureOut">
               <a:rPr lang="en-US" smtClean="0"/>
-              <a:t>4/26/2017</a:t>
+              <a:t>5/1/2017</a:t>
             </a:fld>
             <a:endParaRPr lang="en-US" dirty="0"/>
           </a:p>
@@ -2692,7 +2998,7 @@
           <a:p>
             <a:fld id="{AB134690-1557-4C89-A502-4959FE7FAD70}" type="datetimeFigureOut">
               <a:rPr lang="en-US" smtClean="0"/>
-              <a:t>4/26/2017</a:t>
+              <a:t>5/1/2017</a:t>
             </a:fld>
             <a:endParaRPr lang="en-US" dirty="0"/>
           </a:p>
@@ -3051,7 +3357,7 @@
           <a:p>
             <a:fld id="{4F7D4976-E339-4826-83B7-FBD03F55ECF8}" type="datetimeFigureOut">
               <a:rPr lang="en-US" smtClean="0"/>
-              <a:t>4/26/2017</a:t>
+              <a:t>5/1/2017</a:t>
             </a:fld>
             <a:endParaRPr lang="en-US" dirty="0"/>
           </a:p>
@@ -3192,7 +3498,7 @@
           <a:p>
             <a:fld id="{E1037C31-9E7A-4F99-8774-A0E530DE1A42}" type="datetimeFigureOut">
               <a:rPr lang="en-US" smtClean="0"/>
-              <a:t>4/26/2017</a:t>
+              <a:t>5/1/2017</a:t>
             </a:fld>
             <a:endParaRPr lang="en-US" dirty="0"/>
           </a:p>
@@ -3287,7 +3593,7 @@
           <a:p>
             <a:fld id="{C278504F-A551-4DE0-9316-4DCD1D8CC752}" type="datetimeFigureOut">
               <a:rPr lang="en-US" smtClean="0"/>
-              <a:t>4/26/2017</a:t>
+              <a:t>5/1/2017</a:t>
             </a:fld>
             <a:endParaRPr lang="en-US" dirty="0"/>
           </a:p>
@@ -3644,7 +3950,7 @@
           <a:p>
             <a:fld id="{D1BE4249-C0D0-4B06-8692-E8BB871AF643}" type="datetimeFigureOut">
               <a:rPr lang="en-US" smtClean="0"/>
-              <a:t>4/26/2017</a:t>
+              <a:t>5/1/2017</a:t>
             </a:fld>
             <a:endParaRPr lang="en-US" dirty="0"/>
           </a:p>
@@ -4001,7 +4307,7 @@
           <a:p>
             <a:fld id="{042B0DB6-F5C7-45FB-8CF3-31B45F9C2DAC}" type="datetimeFigureOut">
               <a:rPr lang="en-US" smtClean="0"/>
-              <a:t>4/26/2017</a:t>
+              <a:t>5/1/2017</a:t>
             </a:fld>
             <a:endParaRPr lang="en-US" dirty="0"/>
           </a:p>
@@ -4242,7 +4548,7 @@
           <a:p>
             <a:fld id="{1160EA64-D806-43AC-9DF2-F8C432F32B4C}" type="datetimeFigureOut">
               <a:rPr lang="en-US" smtClean="0"/>
-              <a:t>4/26/2017</a:t>
+              <a:t>5/1/2017</a:t>
             </a:fld>
             <a:endParaRPr lang="en-US" dirty="0"/>
           </a:p>
@@ -4752,11 +5058,11 @@
   <p:clrMapOvr>
     <a:masterClrMapping/>
   </p:clrMapOvr>
-  <mc:AlternateContent xmlns:mc="http://schemas.openxmlformats.org/markup-compatibility/2006">
-    <mc:Choice xmlns:p14="http://schemas.microsoft.com/office/powerpoint/2010/main" Requires="p14">
+  <mc:AlternateContent xmlns:mc="http://schemas.openxmlformats.org/markup-compatibility/2006" xmlns:p14="http://schemas.microsoft.com/office/powerpoint/2010/main">
+    <mc:Choice Requires="p14">
       <p:transition spd="slow" p14:dur="2000"/>
     </mc:Choice>
-    <mc:Fallback>
+    <mc:Fallback xmlns="">
       <p:transition spd="slow"/>
     </mc:Fallback>
   </mc:AlternateContent>
@@ -4829,11 +5135,16 @@
           <a:p>
             <a:r>
               <a:rPr lang="en-GB" sz="2400" dirty="0" smtClean="0"/>
-              <a:t>What is quantum computing</a:t>
-            </a:r>
+              <a:t>What is quantum computing?</a:t>
+            </a:r>
+          </a:p>
+          <a:p>
+            <a:endParaRPr lang="en-GB" sz="2400" dirty="0" smtClean="0"/>
+          </a:p>
+          <a:p>
             <a:r>
               <a:rPr lang="en-GB" sz="2400" dirty="0" smtClean="0"/>
-              <a:t>?</a:t>
+              <a:t>Why I am passionate about it?</a:t>
             </a:r>
           </a:p>
           <a:p>
@@ -4842,37 +5153,16 @@
           <a:p>
             <a:r>
               <a:rPr lang="en-GB" sz="2400" dirty="0" smtClean="0"/>
-              <a:t>Why </a:t>
-            </a:r>
+              <a:t>How it impacts people.</a:t>
+            </a:r>
+          </a:p>
+          <a:p>
+            <a:endParaRPr lang="en-GB" sz="2400" dirty="0" smtClean="0"/>
+          </a:p>
+          <a:p>
             <a:r>
               <a:rPr lang="en-GB" sz="2400" dirty="0" smtClean="0"/>
-              <a:t>I am passionate about it?</a:t>
-            </a:r>
-          </a:p>
-          <a:p>
-            <a:endParaRPr lang="en-GB" sz="2400" dirty="0" smtClean="0"/>
-          </a:p>
-          <a:p>
-            <a:r>
-              <a:rPr lang="en-GB" sz="2400" dirty="0" smtClean="0"/>
-              <a:t>How </a:t>
-            </a:r>
-            <a:r>
-              <a:rPr lang="en-GB" sz="2400" dirty="0" smtClean="0"/>
-              <a:t>it impacts people.</a:t>
-            </a:r>
-          </a:p>
-          <a:p>
-            <a:endParaRPr lang="en-GB" sz="2400" dirty="0" smtClean="0"/>
-          </a:p>
-          <a:p>
-            <a:r>
-              <a:rPr lang="en-GB" sz="2400" dirty="0" smtClean="0"/>
-              <a:t>Security </a:t>
-            </a:r>
-            <a:r>
-              <a:rPr lang="en-GB" sz="2400" dirty="0" smtClean="0"/>
-              <a:t>is important!</a:t>
+              <a:t>Security is important!</a:t>
             </a:r>
             <a:endParaRPr lang="en-GB" sz="2400" dirty="0"/>
           </a:p>
@@ -4888,11 +5178,11 @@
   <p:clrMapOvr>
     <a:masterClrMapping/>
   </p:clrMapOvr>
-  <mc:AlternateContent xmlns:mc="http://schemas.openxmlformats.org/markup-compatibility/2006">
-    <mc:Choice xmlns:p14="http://schemas.microsoft.com/office/powerpoint/2010/main" Requires="p14">
+  <mc:AlternateContent xmlns:mc="http://schemas.openxmlformats.org/markup-compatibility/2006" xmlns:p14="http://schemas.microsoft.com/office/powerpoint/2010/main">
+    <mc:Choice Requires="p14">
       <p:transition p14:dur="0"/>
     </mc:Choice>
-    <mc:Fallback>
+    <mc:Fallback xmlns="">
       <p:transition/>
     </mc:Fallback>
   </mc:AlternateContent>
@@ -4946,88 +5236,6 @@
           </a:p>
         </p:txBody>
       </p:sp>
-      <p:sp>
-        <p:nvSpPr>
-          <p:cNvPr id="3" name="Content Placeholder 2"/>
-          <p:cNvSpPr>
-            <a:spLocks noGrp="1"/>
-          </p:cNvSpPr>
-          <p:nvPr>
-            <p:ph idx="1"/>
-          </p:nvPr>
-        </p:nvSpPr>
-        <p:spPr>
-          <a:xfrm>
-            <a:off x="694774" y="2828228"/>
-            <a:ext cx="6983285" cy="3101983"/>
-          </a:xfrm>
-        </p:spPr>
-        <p:txBody>
-          <a:bodyPr>
-            <a:normAutofit fontScale="92500" lnSpcReduction="10000"/>
-          </a:bodyPr>
-          <a:lstStyle/>
-          <a:p>
-            <a:r>
-              <a:rPr lang="en-GB" sz="2400" dirty="0" smtClean="0"/>
-              <a:t>Computing </a:t>
-            </a:r>
-            <a:r>
-              <a:rPr lang="en-GB" sz="2400" dirty="0"/>
-              <a:t>with qubits rather than </a:t>
-            </a:r>
-            <a:r>
-              <a:rPr lang="en-GB" sz="2400" dirty="0" smtClean="0"/>
-              <a:t>bits</a:t>
-            </a:r>
-            <a:endParaRPr lang="en-GB" sz="2400" dirty="0" smtClean="0"/>
-          </a:p>
-          <a:p>
-            <a:endParaRPr lang="en-GB" sz="2400" dirty="0" smtClean="0"/>
-          </a:p>
-          <a:p>
-            <a:r>
-              <a:rPr lang="en-GB" sz="2400" dirty="0" smtClean="0"/>
-              <a:t>Uses s</a:t>
-            </a:r>
-            <a:r>
-              <a:rPr lang="en-GB" sz="2400" dirty="0" smtClean="0"/>
-              <a:t>uperposition </a:t>
-            </a:r>
-            <a:r>
-              <a:rPr lang="en-GB" sz="2400" dirty="0" smtClean="0"/>
-              <a:t>of particles</a:t>
-            </a:r>
-          </a:p>
-          <a:p>
-            <a:endParaRPr lang="en-GB" sz="2400" dirty="0" smtClean="0"/>
-          </a:p>
-          <a:p>
-            <a:r>
-              <a:rPr lang="en-GB" sz="2400" dirty="0" smtClean="0"/>
-              <a:t>Returns </a:t>
-            </a:r>
-            <a:r>
-              <a:rPr lang="en-GB" sz="2400" dirty="0" smtClean="0"/>
-              <a:t>a </a:t>
-            </a:r>
-            <a:r>
-              <a:rPr lang="en-GB" sz="2400" dirty="0" smtClean="0"/>
-              <a:t>probability for minimisation</a:t>
-            </a:r>
-          </a:p>
-          <a:p>
-            <a:endParaRPr lang="en-GB" sz="2400" dirty="0" smtClean="0"/>
-          </a:p>
-          <a:p>
-            <a:r>
-              <a:rPr lang="en-GB" sz="2400" dirty="0" smtClean="0"/>
-              <a:t>Produced by D-Wave</a:t>
-            </a:r>
-            <a:endParaRPr lang="en-GB" sz="2400" dirty="0"/>
-          </a:p>
-        </p:txBody>
-      </p:sp>
       <p:pic>
         <p:nvPicPr>
           <p:cNvPr id="1026" name="Picture 2" descr="https://upload.wikimedia.org/wikipedia/commons/thumb/5/53/Quantum_computer.svg/307px-Quantum_computer.svg.png"/>
@@ -5036,7 +5244,7 @@
           </p:cNvPicPr>
           <p:nvPr/>
         </p:nvPicPr>
-        <p:blipFill>
+        <p:blipFill rotWithShape="1">
           <a:blip r:embed="rId3">
             <a:extLst>
               <a:ext uri="{28A0092B-C50C-407E-A947-70E740481C1C}">
@@ -5044,15 +5252,13 @@
               </a:ext>
             </a:extLst>
           </a:blip>
-          <a:srcRect/>
-          <a:stretch>
-            <a:fillRect/>
-          </a:stretch>
+          <a:srcRect b="14243"/>
+          <a:stretch/>
         </p:blipFill>
         <p:spPr bwMode="auto">
           <a:xfrm>
-            <a:off x="7678059" y="2645306"/>
-            <a:ext cx="3615842" cy="3674734"/>
+            <a:off x="4288079" y="2750679"/>
+            <a:ext cx="3615842" cy="3151357"/>
           </a:xfrm>
           <a:prstGeom prst="rect">
             <a:avLst/>
@@ -5079,11 +5285,11 @@
   <p:clrMapOvr>
     <a:masterClrMapping/>
   </p:clrMapOvr>
-  <mc:AlternateContent xmlns:mc="http://schemas.openxmlformats.org/markup-compatibility/2006">
-    <mc:Choice xmlns:p14="http://schemas.microsoft.com/office/powerpoint/2010/main" Requires="p14">
+  <mc:AlternateContent xmlns:mc="http://schemas.openxmlformats.org/markup-compatibility/2006" xmlns:p14="http://schemas.microsoft.com/office/powerpoint/2010/main">
+    <mc:Choice Requires="p14">
       <p:transition spd="slow" p14:dur="2000"/>
     </mc:Choice>
-    <mc:Fallback>
+    <mc:Fallback xmlns="">
       <p:transition spd="slow"/>
     </mc:Fallback>
   </mc:AlternateContent>
@@ -5170,11 +5376,7 @@
           <a:p>
             <a:r>
               <a:rPr lang="en-GB" sz="2400" dirty="0" smtClean="0"/>
-              <a:t>Currently, huge undiscovered </a:t>
-            </a:r>
-            <a:r>
-              <a:rPr lang="en-GB" sz="2400" dirty="0" smtClean="0"/>
-              <a:t>potential</a:t>
+              <a:t>Currently, huge undiscovered potential</a:t>
             </a:r>
           </a:p>
           <a:p>
@@ -5191,7 +5393,7 @@
       </p:sp>
       <p:pic>
         <p:nvPicPr>
-          <p:cNvPr id="2050" name="Picture 2" descr="https://d1o50x50snmhul.cloudfront.net/wp-content/uploads/2015/08/dn28078-1_800.jpg"/>
+          <p:cNvPr id="3074" name="Picture 2" descr="https://www.dwavesys.com/sites/default/files/styles/featured_teaser/public/2000Q%20Systems%20in%20Lab%20for%20website.jpg?itok=pauu7Oa_"/>
           <p:cNvPicPr>
             <a:picLocks noChangeAspect="1" noChangeArrowheads="1"/>
           </p:cNvPicPr>
@@ -5212,8 +5414,8 @@
         </p:blipFill>
         <p:spPr bwMode="auto">
           <a:xfrm>
-            <a:off x="7193279" y="2808732"/>
-            <a:ext cx="4300855" cy="2865445"/>
+            <a:off x="6516751" y="2808732"/>
+            <a:ext cx="4720590" cy="3147060"/>
           </a:xfrm>
           <a:prstGeom prst="rect">
             <a:avLst/>
@@ -5240,11 +5442,11 @@
   <p:clrMapOvr>
     <a:masterClrMapping/>
   </p:clrMapOvr>
-  <mc:AlternateContent xmlns:mc="http://schemas.openxmlformats.org/markup-compatibility/2006">
-    <mc:Choice xmlns:p14="http://schemas.microsoft.com/office/powerpoint/2010/main" Requires="p14">
+  <mc:AlternateContent xmlns:mc="http://schemas.openxmlformats.org/markup-compatibility/2006" xmlns:p14="http://schemas.microsoft.com/office/powerpoint/2010/main">
+    <mc:Choice Requires="p14">
       <p:transition spd="slow" p14:dur="2000"/>
     </mc:Choice>
-    <mc:Fallback>
+    <mc:Fallback xmlns="">
       <p:transition spd="slow"/>
     </mc:Fallback>
   </mc:AlternateContent>
@@ -5292,7 +5494,7 @@
           <a:p>
             <a:r>
               <a:rPr lang="en-GB" dirty="0" smtClean="0"/>
-              <a:t>How it impacts me</a:t>
+              <a:t>How it impacts society</a:t>
             </a:r>
             <a:endParaRPr lang="en-GB" dirty="0"/>
           </a:p>
@@ -5310,8 +5512,8 @@
         </p:nvSpPr>
         <p:spPr>
           <a:xfrm>
-            <a:off x="547479" y="2463873"/>
-            <a:ext cx="7130578" cy="3101983"/>
+            <a:off x="547480" y="2463876"/>
+            <a:ext cx="6584840" cy="4086347"/>
           </a:xfrm>
         </p:spPr>
         <p:txBody>
@@ -5322,48 +5524,23 @@
           <a:p>
             <a:r>
               <a:rPr lang="en-GB" sz="2400" b="1" dirty="0" smtClean="0"/>
-              <a:t>Labelling </a:t>
-            </a:r>
-            <a:r>
-              <a:rPr lang="en-GB" sz="2400" b="1" dirty="0"/>
-              <a:t>n</a:t>
-            </a:r>
-            <a:r>
-              <a:rPr lang="en-GB" sz="2400" b="1" dirty="0" smtClean="0"/>
-              <a:t>ews </a:t>
-            </a:r>
-            <a:r>
-              <a:rPr lang="en-GB" sz="2400" b="1" dirty="0"/>
-              <a:t>s</a:t>
-            </a:r>
-            <a:r>
-              <a:rPr lang="en-GB" sz="2400" b="1" dirty="0" smtClean="0"/>
-              <a:t>tories</a:t>
-            </a:r>
-            <a:endParaRPr lang="en-GB" sz="2400" b="1" dirty="0" smtClean="0"/>
+              <a:t>Weather forecasting</a:t>
+            </a:r>
           </a:p>
           <a:p>
             <a:r>
               <a:rPr lang="en-GB" sz="2400" dirty="0" smtClean="0"/>
-              <a:t>All news stories and images need category labels</a:t>
+              <a:t>Best accurate forecasting a week in advance</a:t>
             </a:r>
           </a:p>
           <a:p>
             <a:r>
               <a:rPr lang="en-GB" sz="2400" dirty="0" smtClean="0"/>
-              <a:t>Uses the </a:t>
-            </a:r>
-            <a:r>
-              <a:rPr lang="en-GB" sz="2400" dirty="0"/>
-              <a:t>REUTERS </a:t>
-            </a:r>
-            <a:r>
-              <a:rPr lang="en-GB" sz="2400" dirty="0" smtClean="0"/>
-              <a:t>and SCENE corpus</a:t>
-            </a:r>
-          </a:p>
-          <a:p>
-            <a:endParaRPr lang="en-GB" sz="2400" dirty="0" smtClean="0"/>
+              <a:t>Far too much data to analyse at once</a:t>
+            </a:r>
+          </a:p>
+          <a:p>
+            <a:endParaRPr lang="en-GB" sz="2400" dirty="0"/>
           </a:p>
           <a:p>
             <a:r>
@@ -5372,46 +5549,68 @@
             </a:r>
             <a:r>
               <a:rPr lang="en-US" sz="2400" i="1" dirty="0"/>
-              <a:t>We found that our approach worked extremely well on </a:t>
-            </a:r>
-            <a:r>
-              <a:rPr lang="en-US" sz="2400" i="1" dirty="0" smtClean="0"/>
-              <a:t>these problems</a:t>
-            </a:r>
-            <a:r>
-              <a:rPr lang="en-US" sz="2400" i="1" dirty="0" smtClean="0"/>
-              <a:t>” – D-Wave</a:t>
-            </a:r>
-            <a:endParaRPr lang="en-US" sz="2400" i="1" dirty="0" smtClean="0"/>
-          </a:p>
-          <a:p>
-            <a:r>
-              <a:rPr lang="en-US" sz="2400" i="1" dirty="0" smtClean="0"/>
-              <a:t>“ [</a:t>
-            </a:r>
-            <a:r>
-              <a:rPr lang="en-US" sz="2400" i="1" dirty="0"/>
-              <a:t>D</a:t>
-            </a:r>
-            <a:r>
-              <a:rPr lang="en-US" sz="2400" i="1" dirty="0" smtClean="0"/>
-              <a:t>wave] provided </a:t>
-            </a:r>
-            <a:r>
-              <a:rPr lang="en-US" sz="2400" i="1" dirty="0"/>
-              <a:t>better labeling accuracy than a state of the art conventional approach</a:t>
-            </a:r>
-            <a:r>
-              <a:rPr lang="en-US" sz="2400" i="1" dirty="0" smtClean="0"/>
-              <a:t>.”- D-Wave</a:t>
-            </a:r>
-            <a:endParaRPr lang="en-GB" sz="2400" i="1" dirty="0"/>
+              <a:t>We'd have advanced notice of major storms like hurricanes and the extra prep time could help save lives.” </a:t>
+            </a:r>
+            <a:r>
+              <a:rPr lang="en-US" sz="2400" dirty="0" smtClean="0"/>
+              <a:t>- </a:t>
+            </a:r>
+            <a:r>
+              <a:rPr lang="en-US" sz="2400" dirty="0"/>
+              <a:t>Ray </a:t>
+            </a:r>
+            <a:r>
+              <a:rPr lang="en-US" sz="2400" dirty="0" smtClean="0"/>
+              <a:t>Johnson </a:t>
+            </a:r>
+            <a:r>
+              <a:rPr lang="en-US" sz="2400" dirty="0"/>
+              <a:t>board member at </a:t>
+            </a:r>
+            <a:r>
+              <a:rPr lang="en-US" sz="2400" dirty="0" err="1" smtClean="0"/>
+              <a:t>QxBranch</a:t>
+            </a:r>
+            <a:endParaRPr lang="en-GB" sz="2400" dirty="0"/>
+          </a:p>
+        </p:txBody>
+      </p:sp>
+      <p:sp>
+        <p:nvSpPr>
+          <p:cNvPr id="6" name="TextBox 5"/>
+          <p:cNvSpPr txBox="1"/>
+          <p:nvPr/>
+        </p:nvSpPr>
+        <p:spPr>
+          <a:xfrm>
+            <a:off x="0" y="6550223"/>
+            <a:ext cx="6496907" cy="307777"/>
+          </a:xfrm>
+          <a:prstGeom prst="rect">
+            <a:avLst/>
+          </a:prstGeom>
+          <a:noFill/>
+        </p:spPr>
+        <p:txBody>
+          <a:bodyPr wrap="none" rtlCol="0">
+            <a:spAutoFit/>
+          </a:bodyPr>
+          <a:lstStyle/>
+          <a:p>
+            <a:r>
+              <a:rPr lang="en-GB" sz="1400" dirty="0" smtClean="0"/>
+              <a:t>Source http</a:t>
+            </a:r>
+            <a:r>
+              <a:rPr lang="en-GB" sz="1400" dirty="0"/>
+              <a:t>://uk.businessinsider.com/quantum-computers-will-change-the-world-2015-4</a:t>
+            </a:r>
           </a:p>
         </p:txBody>
       </p:sp>
       <p:pic>
         <p:nvPicPr>
-          <p:cNvPr id="3074" name="Picture 2" descr="https://cst.org.uk/data/image/8/e/8e3e848cbd24bdb85a7c97869ec77386.1451995352.jpg"/>
+          <p:cNvPr id="1026" name="Picture 2" descr="http://cdn.images.express.co.uk/img/dynamic/153/590x/secondary/weather-forecast-431835.jpg"/>
           <p:cNvPicPr>
             <a:picLocks noChangeAspect="1" noChangeArrowheads="1"/>
           </p:cNvPicPr>
@@ -5432,8 +5631,8 @@
         </p:blipFill>
         <p:spPr bwMode="auto">
           <a:xfrm>
-            <a:off x="7759617" y="2638043"/>
-            <a:ext cx="3695856" cy="2587099"/>
+            <a:off x="7238567" y="2784033"/>
+            <a:ext cx="4226941" cy="3446032"/>
           </a:xfrm>
           <a:prstGeom prst="rect">
             <a:avLst/>
@@ -5450,54 +5649,21 @@
           </a:extLst>
         </p:spPr>
       </p:pic>
-      <p:sp>
-        <p:nvSpPr>
-          <p:cNvPr id="5" name="TextBox 4"/>
-          <p:cNvSpPr txBox="1"/>
-          <p:nvPr/>
-        </p:nvSpPr>
-        <p:spPr>
-          <a:xfrm>
-            <a:off x="0" y="6550223"/>
-            <a:ext cx="5109156" cy="307777"/>
-          </a:xfrm>
-          <a:prstGeom prst="rect">
-            <a:avLst/>
-          </a:prstGeom>
-          <a:noFill/>
-        </p:spPr>
-        <p:txBody>
-          <a:bodyPr wrap="none" rtlCol="0">
-            <a:spAutoFit/>
-          </a:bodyPr>
-          <a:lstStyle/>
-          <a:p>
-            <a:r>
-              <a:rPr lang="en-GB" sz="1400" dirty="0" smtClean="0"/>
-              <a:t>Source: </a:t>
-            </a:r>
-            <a:r>
-              <a:rPr lang="en-GB" sz="1400" dirty="0"/>
-              <a:t>https://www.dwavesys.com/quantum-computing/applications</a:t>
-            </a:r>
-          </a:p>
-        </p:txBody>
-      </p:sp>
     </p:spTree>
     <p:extLst>
       <p:ext uri="{BB962C8B-B14F-4D97-AF65-F5344CB8AC3E}">
-        <p14:creationId xmlns:p14="http://schemas.microsoft.com/office/powerpoint/2010/main" val="843923097"/>
+        <p14:creationId xmlns:p14="http://schemas.microsoft.com/office/powerpoint/2010/main" val="358675731"/>
       </p:ext>
     </p:extLst>
   </p:cSld>
   <p:clrMapOvr>
     <a:masterClrMapping/>
   </p:clrMapOvr>
-  <mc:AlternateContent xmlns:mc="http://schemas.openxmlformats.org/markup-compatibility/2006">
-    <mc:Choice xmlns:p14="http://schemas.microsoft.com/office/powerpoint/2010/main" Requires="p14">
+  <mc:AlternateContent xmlns:mc="http://schemas.openxmlformats.org/markup-compatibility/2006" xmlns:p14="http://schemas.microsoft.com/office/powerpoint/2010/main">
+    <mc:Choice Requires="p14">
       <p:transition spd="slow" p14:dur="2000"/>
     </mc:Choice>
-    <mc:Fallback>
+    <mc:Fallback xmlns="">
       <p:transition spd="slow"/>
     </mc:Fallback>
   </mc:AlternateContent>
@@ -5575,13 +5741,8 @@
           <a:p>
             <a:r>
               <a:rPr lang="en-GB" sz="2600" b="1" dirty="0" smtClean="0"/>
-              <a:t>Finance and </a:t>
-            </a:r>
-            <a:r>
-              <a:rPr lang="en-GB" sz="2600" b="1" dirty="0" smtClean="0"/>
-              <a:t>trading</a:t>
-            </a:r>
-            <a:endParaRPr lang="en-GB" sz="2600" b="1" dirty="0" smtClean="0"/>
+              <a:t>Finance and trading</a:t>
+            </a:r>
           </a:p>
           <a:p>
             <a:r>
@@ -5673,13 +5834,8 @@
             </a:r>
             <a:r>
               <a:rPr lang="en-GB" sz="1400" dirty="0"/>
-              <a:t>: </a:t>
-            </a:r>
-            <a:r>
-              <a:rPr lang="en-GB" sz="1400" dirty="0"/>
-              <a:t>http://www.bbc.co.uk/news/business-35886456</a:t>
-            </a:r>
-            <a:endParaRPr lang="en-GB" sz="1400" dirty="0"/>
+              <a:t>: http://www.bbc.co.uk/news/business-35886456</a:t>
+            </a:r>
           </a:p>
         </p:txBody>
       </p:sp>
@@ -5734,11 +5890,11 @@
   <p:clrMapOvr>
     <a:masterClrMapping/>
   </p:clrMapOvr>
-  <mc:AlternateContent xmlns:mc="http://schemas.openxmlformats.org/markup-compatibility/2006">
-    <mc:Choice xmlns:p14="http://schemas.microsoft.com/office/powerpoint/2010/main" Requires="p14">
+  <mc:AlternateContent xmlns:mc="http://schemas.openxmlformats.org/markup-compatibility/2006" xmlns:p14="http://schemas.microsoft.com/office/powerpoint/2010/main">
+    <mc:Choice Requires="p14">
       <p:transition spd="slow" p14:dur="2000"/>
     </mc:Choice>
-    <mc:Fallback>
+    <mc:Fallback xmlns="">
       <p:transition spd="slow"/>
     </mc:Fallback>
   </mc:AlternateContent>
@@ -5786,7 +5942,7 @@
           <a:p>
             <a:r>
               <a:rPr lang="en-GB" dirty="0" smtClean="0"/>
-              <a:t>How it impacts society</a:t>
+              <a:t>How it impacts me</a:t>
             </a:r>
             <a:endParaRPr lang="en-GB" dirty="0"/>
           </a:p>
@@ -5804,8 +5960,8 @@
         </p:nvSpPr>
         <p:spPr>
           <a:xfrm>
-            <a:off x="547480" y="2463876"/>
-            <a:ext cx="6143607" cy="3101983"/>
+            <a:off x="547479" y="2463873"/>
+            <a:ext cx="7130578" cy="3101983"/>
           </a:xfrm>
         </p:spPr>
         <p:txBody>
@@ -5816,50 +5972,34 @@
           <a:p>
             <a:r>
               <a:rPr lang="en-GB" sz="2400" b="1" dirty="0" smtClean="0"/>
-              <a:t>Self driving cars</a:t>
-            </a:r>
+              <a:t>Career future</a:t>
+            </a:r>
+          </a:p>
+          <a:p>
+            <a:pPr marL="0" indent="0">
+              <a:buNone/>
+            </a:pPr>
+            <a:endParaRPr lang="en-GB" sz="2400" b="1" dirty="0" smtClean="0"/>
           </a:p>
           <a:p>
             <a:r>
               <a:rPr lang="en-GB" sz="2400" dirty="0" smtClean="0"/>
-              <a:t>Google mainly use quantum computers</a:t>
+              <a:t>Working in the IT field</a:t>
             </a:r>
           </a:p>
           <a:p>
             <a:r>
               <a:rPr lang="en-GB" sz="2400" dirty="0" smtClean="0"/>
-              <a:t>Self driving cars need to identify things it can see</a:t>
-            </a:r>
-          </a:p>
-          <a:p>
-            <a:endParaRPr lang="en-GB" sz="2400" dirty="0"/>
-          </a:p>
-          <a:p>
-            <a:r>
-              <a:rPr lang="en-GB" sz="2400" i="1" dirty="0" smtClean="0"/>
-              <a:t>“</a:t>
-            </a:r>
-            <a:r>
-              <a:rPr lang="en-US" sz="2400" i="1" dirty="0"/>
-              <a:t>Google has shown the D-Wave can significantly outperform on traditional </a:t>
-            </a:r>
-            <a:r>
-              <a:rPr lang="en-US" sz="2400" i="1" dirty="0" smtClean="0"/>
-              <a:t>chips” </a:t>
-            </a:r>
-            <a:r>
-              <a:rPr lang="en-US" sz="2400" dirty="0" smtClean="0"/>
-              <a:t>- wired</a:t>
-            </a:r>
-            <a:endParaRPr lang="en-GB" sz="2400" dirty="0"/>
+              <a:t>Quantum computing will have a massive impact</a:t>
+            </a:r>
           </a:p>
         </p:txBody>
       </p:sp>
       <p:pic>
         <p:nvPicPr>
-          <p:cNvPr id="4" name="Picture 3"/>
+          <p:cNvPr id="2050" name="Picture 2" descr="http://wordpress-patten.edu.s3.amazonaws.com/wp-content/uploads/bigstock-Concept-conceptual-D-male-bus-82608323.jpg"/>
           <p:cNvPicPr>
-            <a:picLocks noChangeAspect="1"/>
+            <a:picLocks noChangeAspect="1" noChangeArrowheads="1"/>
           </p:cNvPicPr>
           <p:nvPr/>
         </p:nvPicPr>
@@ -5871,69 +6011,46 @@
               </a:ext>
             </a:extLst>
           </a:blip>
+          <a:srcRect/>
           <a:stretch>
             <a:fillRect/>
           </a:stretch>
         </p:blipFill>
-        <p:spPr>
+        <p:spPr bwMode="auto">
           <a:xfrm>
-            <a:off x="7221067" y="2638043"/>
-            <a:ext cx="4201863" cy="2790299"/>
-          </a:xfrm>
-          <a:prstGeom prst="rect">
-            <a:avLst/>
-          </a:prstGeom>
-        </p:spPr>
-      </p:pic>
-      <p:sp>
-        <p:nvSpPr>
-          <p:cNvPr id="6" name="TextBox 5"/>
-          <p:cNvSpPr txBox="1"/>
-          <p:nvPr/>
-        </p:nvSpPr>
-        <p:spPr>
-          <a:xfrm>
-            <a:off x="0" y="6550223"/>
-            <a:ext cx="6972614" cy="307777"/>
+            <a:off x="7278623" y="2576816"/>
+            <a:ext cx="3985387" cy="2989040"/>
           </a:xfrm>
           <a:prstGeom prst="rect">
             <a:avLst/>
           </a:prstGeom>
           <a:noFill/>
+          <a:extLst>
+            <a:ext uri="{909E8E84-426E-40DD-AFC4-6F175D3DCCD1}">
+              <a14:hiddenFill xmlns:a14="http://schemas.microsoft.com/office/drawing/2010/main">
+                <a:solidFill>
+                  <a:srgbClr val="FFFFFF"/>
+                </a:solidFill>
+              </a14:hiddenFill>
+            </a:ext>
+          </a:extLst>
         </p:spPr>
-        <p:txBody>
-          <a:bodyPr wrap="none" rtlCol="0">
-            <a:spAutoFit/>
-          </a:bodyPr>
-          <a:lstStyle/>
-          <a:p>
-            <a:r>
-              <a:rPr lang="en-GB" sz="1400" dirty="0" smtClean="0"/>
-              <a:t>Source: https</a:t>
-            </a:r>
-            <a:r>
-              <a:rPr lang="en-GB" sz="1400" dirty="0"/>
-              <a:t>://www.wired.com/2015/12/for-google-quantum-computing-is-like-learning-to-fly/</a:t>
-            </a:r>
-            <a:endParaRPr lang="en-GB" sz="1400" dirty="0"/>
-          </a:p>
-        </p:txBody>
-      </p:sp>
+      </p:pic>
     </p:spTree>
     <p:extLst>
       <p:ext uri="{BB962C8B-B14F-4D97-AF65-F5344CB8AC3E}">
-        <p14:creationId xmlns:p14="http://schemas.microsoft.com/office/powerpoint/2010/main" val="358675731"/>
+        <p14:creationId xmlns:p14="http://schemas.microsoft.com/office/powerpoint/2010/main" val="843923097"/>
       </p:ext>
     </p:extLst>
   </p:cSld>
   <p:clrMapOvr>
     <a:masterClrMapping/>
   </p:clrMapOvr>
-  <mc:AlternateContent xmlns:mc="http://schemas.openxmlformats.org/markup-compatibility/2006">
-    <mc:Choice xmlns:p14="http://schemas.microsoft.com/office/powerpoint/2010/main" Requires="p14">
+  <mc:AlternateContent xmlns:mc="http://schemas.openxmlformats.org/markup-compatibility/2006" xmlns:p14="http://schemas.microsoft.com/office/powerpoint/2010/main">
+    <mc:Choice Requires="p14">
       <p:transition spd="slow" p14:dur="2000"/>
     </mc:Choice>
-    <mc:Fallback>
+    <mc:Fallback xmlns="">
       <p:transition spd="slow"/>
     </mc:Fallback>
   </mc:AlternateContent>
@@ -6021,18 +6138,33 @@
             </a:r>
           </a:p>
           <a:p>
+            <a:r>
+              <a:rPr lang="en-GB" sz="2400" dirty="0" smtClean="0"/>
+              <a:t>Quantum secure signatures</a:t>
+            </a:r>
+          </a:p>
+          <a:p>
             <a:endParaRPr lang="en-GB" sz="2400" dirty="0"/>
           </a:p>
           <a:p>
             <a:r>
               <a:rPr lang="en-GB" sz="2400" dirty="0" smtClean="0"/>
-              <a:t>Can easily be used incorrectly</a:t>
-            </a:r>
+              <a:t>Can easily be used </a:t>
+            </a:r>
+            <a:r>
+              <a:rPr lang="en-GB" sz="2400" dirty="0"/>
+              <a:t>fraudulently</a:t>
+            </a:r>
+            <a:endParaRPr lang="en-GB" sz="2400" dirty="0" smtClean="0"/>
           </a:p>
           <a:p>
             <a:r>
               <a:rPr lang="en-GB" sz="2400" dirty="0" smtClean="0"/>
-              <a:t>They need to be securely accessed</a:t>
+              <a:t>They </a:t>
+            </a:r>
+            <a:r>
+              <a:rPr lang="en-GB" sz="2400" dirty="0" smtClean="0"/>
+              <a:t>need to be securely accessed</a:t>
             </a:r>
             <a:endParaRPr lang="en-GB" sz="2400" dirty="0"/>
           </a:p>
@@ -6087,8 +6219,8 @@
         </p:nvSpPr>
         <p:spPr>
           <a:xfrm>
-            <a:off x="0" y="6334780"/>
-            <a:ext cx="6077754" cy="523220"/>
+            <a:off x="18246" y="6119336"/>
+            <a:ext cx="6077754" cy="738664"/>
           </a:xfrm>
           <a:prstGeom prst="rect">
             <a:avLst/>
@@ -6107,7 +6239,17 @@
             </a:r>
             <a:r>
               <a:rPr lang="en-GB" sz="1400" dirty="0"/>
-              <a:t>: https://</a:t>
+              <a:t>: https://blogs.cisco.com/security/quantum-resistant-signatures-an-update</a:t>
+            </a:r>
+          </a:p>
+          <a:p>
+            <a:r>
+              <a:rPr lang="en-GB" sz="1400" dirty="0" smtClean="0"/>
+              <a:t>https</a:t>
+            </a:r>
+            <a:r>
+              <a:rPr lang="en-GB" sz="1400" dirty="0"/>
+              <a:t>://</a:t>
             </a:r>
             <a:r>
               <a:rPr lang="en-GB" sz="1400" dirty="0" smtClean="0"/>
@@ -6119,7 +6261,6 @@
               <a:rPr lang="en-GB" sz="1400" dirty="0"/>
               <a:t>http://www.wired.co.uk/article/quantum-computers-quantum-security-encryption</a:t>
             </a:r>
-            <a:endParaRPr lang="en-GB" sz="1400" dirty="0"/>
           </a:p>
         </p:txBody>
       </p:sp>
@@ -6133,11 +6274,11 @@
   <p:clrMapOvr>
     <a:masterClrMapping/>
   </p:clrMapOvr>
-  <mc:AlternateContent xmlns:mc="http://schemas.openxmlformats.org/markup-compatibility/2006">
-    <mc:Choice xmlns:p14="http://schemas.microsoft.com/office/powerpoint/2010/main" Requires="p14">
+  <mc:AlternateContent xmlns:mc="http://schemas.openxmlformats.org/markup-compatibility/2006" xmlns:p14="http://schemas.microsoft.com/office/powerpoint/2010/main">
+    <mc:Choice Requires="p14">
       <p:transition spd="slow" p14:dur="2000"/>
     </mc:Choice>
-    <mc:Fallback>
+    <mc:Fallback xmlns="">
       <p:transition spd="slow"/>
     </mc:Fallback>
   </mc:AlternateContent>
@@ -6224,11 +6365,11 @@
   <p:clrMapOvr>
     <a:masterClrMapping/>
   </p:clrMapOvr>
-  <mc:AlternateContent xmlns:mc="http://schemas.openxmlformats.org/markup-compatibility/2006">
-    <mc:Choice xmlns:p14="http://schemas.microsoft.com/office/powerpoint/2010/main" Requires="p14">
+  <mc:AlternateContent xmlns:mc="http://schemas.openxmlformats.org/markup-compatibility/2006" xmlns:p14="http://schemas.microsoft.com/office/powerpoint/2010/main">
+    <mc:Choice Requires="p14">
       <p:transition spd="slow" p14:dur="2000"/>
     </mc:Choice>
-    <mc:Fallback>
+    <mc:Fallback xmlns="">
       <p:transition spd="slow"/>
     </mc:Fallback>
   </mc:AlternateContent>

</xml_diff>